<commit_message>
update carousel, README, and add grateful report
</commit_message>
<xml_diff>
--- a/images/carousel.pptx
+++ b/images/carousel.pptx
@@ -123,6 +123,11 @@
       </a:defRPr>
     </a:lvl9pPr>
   </p:defaultTextStyle>
+  <p:extLst>
+    <p:ext uri="{EFAFB233-063F-42B5-8137-9DF3F51BA10A}">
+      <p15:sldGuideLst xmlns:p15="http://schemas.microsoft.com/office/powerpoint/2012/main"/>
+    </p:ext>
+  </p:extLst>
 </p:presentation>
 </file>
 
@@ -257,7 +262,7 @@
           <a:p>
             <a:fld id="{FA8DCDC1-75EB-46C3-9E4F-688A886F2FA8}" type="datetimeFigureOut">
               <a:rPr lang="en-GB" smtClean="0"/>
-              <a:t>30/12/2025</a:t>
+              <a:t>31/12/2025</a:t>
             </a:fld>
             <a:endParaRPr lang="en-GB"/>
           </a:p>
@@ -427,7 +432,7 @@
           <a:p>
             <a:fld id="{FA8DCDC1-75EB-46C3-9E4F-688A886F2FA8}" type="datetimeFigureOut">
               <a:rPr lang="en-GB" smtClean="0"/>
-              <a:t>30/12/2025</a:t>
+              <a:t>31/12/2025</a:t>
             </a:fld>
             <a:endParaRPr lang="en-GB"/>
           </a:p>
@@ -607,7 +612,7 @@
           <a:p>
             <a:fld id="{FA8DCDC1-75EB-46C3-9E4F-688A886F2FA8}" type="datetimeFigureOut">
               <a:rPr lang="en-GB" smtClean="0"/>
-              <a:t>30/12/2025</a:t>
+              <a:t>31/12/2025</a:t>
             </a:fld>
             <a:endParaRPr lang="en-GB"/>
           </a:p>
@@ -777,7 +782,7 @@
           <a:p>
             <a:fld id="{FA8DCDC1-75EB-46C3-9E4F-688A886F2FA8}" type="datetimeFigureOut">
               <a:rPr lang="en-GB" smtClean="0"/>
-              <a:t>30/12/2025</a:t>
+              <a:t>31/12/2025</a:t>
             </a:fld>
             <a:endParaRPr lang="en-GB"/>
           </a:p>
@@ -1023,7 +1028,7 @@
           <a:p>
             <a:fld id="{FA8DCDC1-75EB-46C3-9E4F-688A886F2FA8}" type="datetimeFigureOut">
               <a:rPr lang="en-GB" smtClean="0"/>
-              <a:t>30/12/2025</a:t>
+              <a:t>31/12/2025</a:t>
             </a:fld>
             <a:endParaRPr lang="en-GB"/>
           </a:p>
@@ -1255,7 +1260,7 @@
           <a:p>
             <a:fld id="{FA8DCDC1-75EB-46C3-9E4F-688A886F2FA8}" type="datetimeFigureOut">
               <a:rPr lang="en-GB" smtClean="0"/>
-              <a:t>30/12/2025</a:t>
+              <a:t>31/12/2025</a:t>
             </a:fld>
             <a:endParaRPr lang="en-GB"/>
           </a:p>
@@ -1622,7 +1627,7 @@
           <a:p>
             <a:fld id="{FA8DCDC1-75EB-46C3-9E4F-688A886F2FA8}" type="datetimeFigureOut">
               <a:rPr lang="en-GB" smtClean="0"/>
-              <a:t>30/12/2025</a:t>
+              <a:t>31/12/2025</a:t>
             </a:fld>
             <a:endParaRPr lang="en-GB"/>
           </a:p>
@@ -1740,7 +1745,7 @@
           <a:p>
             <a:fld id="{FA8DCDC1-75EB-46C3-9E4F-688A886F2FA8}" type="datetimeFigureOut">
               <a:rPr lang="en-GB" smtClean="0"/>
-              <a:t>30/12/2025</a:t>
+              <a:t>31/12/2025</a:t>
             </a:fld>
             <a:endParaRPr lang="en-GB"/>
           </a:p>
@@ -1835,7 +1840,7 @@
           <a:p>
             <a:fld id="{FA8DCDC1-75EB-46C3-9E4F-688A886F2FA8}" type="datetimeFigureOut">
               <a:rPr lang="en-GB" smtClean="0"/>
-              <a:t>30/12/2025</a:t>
+              <a:t>31/12/2025</a:t>
             </a:fld>
             <a:endParaRPr lang="en-GB"/>
           </a:p>
@@ -2112,7 +2117,7 @@
           <a:p>
             <a:fld id="{FA8DCDC1-75EB-46C3-9E4F-688A886F2FA8}" type="datetimeFigureOut">
               <a:rPr lang="en-GB" smtClean="0"/>
-              <a:t>30/12/2025</a:t>
+              <a:t>31/12/2025</a:t>
             </a:fld>
             <a:endParaRPr lang="en-GB"/>
           </a:p>
@@ -2369,7 +2374,7 @@
           <a:p>
             <a:fld id="{FA8DCDC1-75EB-46C3-9E4F-688A886F2FA8}" type="datetimeFigureOut">
               <a:rPr lang="en-GB" smtClean="0"/>
-              <a:t>30/12/2025</a:t>
+              <a:t>31/12/2025</a:t>
             </a:fld>
             <a:endParaRPr lang="en-GB"/>
           </a:p>
@@ -2582,7 +2587,7 @@
           <a:p>
             <a:fld id="{FA8DCDC1-75EB-46C3-9E4F-688A886F2FA8}" type="datetimeFigureOut">
               <a:rPr lang="en-GB" smtClean="0"/>
-              <a:t>30/12/2025</a:t>
+              <a:t>31/12/2025</a:t>
             </a:fld>
             <a:endParaRPr lang="en-GB"/>
           </a:p>
@@ -3635,7 +3640,7 @@
               <a:rPr lang="en-GB" sz="2000" dirty="0">
                 <a:latin typeface="Avenir Next LT Pro" panose="020B0504020202020204" pitchFamily="34" charset="0"/>
               </a:rPr>
-              <a:t>Below shows a simple LOESS regression of this, the predictions of which for 2020-2025 I could then combine with my weight data from that period</a:t>
+              <a:t>The data are sparse, but below shows a simple LOESS regression of this, the predictions of which for 2020-2025 I could then combine with my weight data from that period</a:t>
             </a:r>
           </a:p>
           <a:p>
@@ -3882,8 +3887,8 @@
         </p:nvSpPr>
         <p:spPr>
           <a:xfrm>
-            <a:off x="338400" y="639157"/>
-            <a:ext cx="7095600" cy="6494085"/>
+            <a:off x="338400" y="823823"/>
+            <a:ext cx="7095600" cy="6555641"/>
           </a:xfrm>
           <a:prstGeom prst="rect">
             <a:avLst/>
@@ -3898,28 +3903,43 @@
           <a:p>
             <a:pPr algn="ctr"/>
             <a:r>
-              <a:rPr lang="en-GB" sz="3200" dirty="0">
-                <a:latin typeface="Avenir Next LT Pro" panose="020B0504020202020204" pitchFamily="34" charset="0"/>
-              </a:rPr>
-              <a:t>Some of you might look at the FFM estimates over time and think it looks like the past 5 years have resulted in some gains… but the truth is it’s all consistent with maintenance when we take the longer-term trend into consideration (all pretty much consistent with the mean).</a:t>
-            </a:r>
-          </a:p>
-          <a:p>
-            <a:pPr algn="ctr"/>
-            <a:endParaRPr lang="en-GB" sz="3200" dirty="0">
+              <a:rPr lang="en-GB" sz="2800" dirty="0">
+                <a:latin typeface="Avenir Next LT Pro" panose="020B0504020202020204" pitchFamily="34" charset="0"/>
+              </a:rPr>
+              <a:t>Some of you might look at the FFM kg estimates over time and think it looks like the past 5 years have resulted in some gains… but take that with a heavy pinch of salt.</a:t>
+            </a:r>
+          </a:p>
+          <a:p>
+            <a:pPr algn="ctr"/>
+            <a:endParaRPr lang="en-GB" sz="2800" dirty="0">
               <a:latin typeface="Avenir Next LT Pro" panose="020B0504020202020204" pitchFamily="34" charset="0"/>
             </a:endParaRPr>
           </a:p>
           <a:p>
             <a:pPr algn="ctr"/>
             <a:r>
-              <a:rPr lang="en-GB" sz="3200" dirty="0">
+              <a:rPr lang="en-GB" sz="2800" dirty="0">
+                <a:latin typeface="Avenir Next LT Pro" panose="020B0504020202020204" pitchFamily="34" charset="0"/>
+              </a:rPr>
+              <a:t>The truth is, considering the sparsity of data and when we take the longer-term trend into consideration, it’s all consistent with maintenance (all pretty much consistent with the mean).</a:t>
+            </a:r>
+          </a:p>
+          <a:p>
+            <a:pPr algn="ctr"/>
+            <a:endParaRPr lang="en-GB" sz="2800" dirty="0">
+              <a:latin typeface="Avenir Next LT Pro" panose="020B0504020202020204" pitchFamily="34" charset="0"/>
+            </a:endParaRPr>
+          </a:p>
+          <a:p>
+            <a:pPr algn="ctr"/>
+            <a:r>
+              <a:rPr lang="en-GB" sz="2800" dirty="0">
                 <a:latin typeface="Avenir Next LT Pro" panose="020B0504020202020204" pitchFamily="34" charset="0"/>
               </a:rPr>
               <a:t>Visually things aren’t much different… </a:t>
             </a:r>
             <a:r>
-              <a:rPr lang="en-GB" sz="3200" dirty="0">
+              <a:rPr lang="en-GB" sz="2800" dirty="0">
                 <a:latin typeface="Avenir Next LT Pro" panose="020B0504020202020204" pitchFamily="34" charset="0"/>
                 <a:sym typeface="Wingdings" panose="05000000000000000000" pitchFamily="2" charset="2"/>
               </a:rPr>
@@ -3929,20 +3949,20 @@
           <a:p>
             <a:pPr algn="ctr"/>
             <a:r>
-              <a:rPr lang="en-GB" sz="3200" dirty="0">
+              <a:rPr lang="en-GB" sz="2800" dirty="0">
                 <a:latin typeface="Avenir Next LT Pro" panose="020B0504020202020204" pitchFamily="34" charset="0"/>
               </a:rPr>
               <a:t>(swipe </a:t>
             </a:r>
             <a:r>
-              <a:rPr lang="en-GB" sz="3200" dirty="0">
+              <a:rPr lang="en-GB" sz="2800" dirty="0">
                 <a:latin typeface="Cambria Math" panose="02040503050406030204" pitchFamily="18" charset="0"/>
                 <a:ea typeface="Cambria Math" panose="02040503050406030204" pitchFamily="18" charset="0"/>
               </a:rPr>
               <a:t>→</a:t>
             </a:r>
             <a:r>
-              <a:rPr lang="en-GB" sz="3200" dirty="0">
+              <a:rPr lang="en-GB" sz="2800" dirty="0">
                 <a:latin typeface="Avenir Next LT Pro" panose="020B0504020202020204" pitchFamily="34" charset="0"/>
               </a:rPr>
               <a:t>)</a:t>
@@ -3950,7 +3970,7 @@
           </a:p>
           <a:p>
             <a:pPr algn="ctr"/>
-            <a:endParaRPr lang="en-GB" sz="3200" dirty="0">
+            <a:endParaRPr lang="en-GB" sz="2800" dirty="0">
               <a:latin typeface="Avenir Next LT Pro" panose="020B0504020202020204" pitchFamily="34" charset="0"/>
             </a:endParaRPr>
           </a:p>
@@ -4006,8 +4026,8 @@
         </p:nvSpPr>
         <p:spPr>
           <a:xfrm>
-            <a:off x="338400" y="149096"/>
-            <a:ext cx="7095600" cy="3046988"/>
+            <a:off x="338400" y="0"/>
+            <a:ext cx="7095600" cy="3416320"/>
           </a:xfrm>
           <a:prstGeom prst="rect">
             <a:avLst/>
@@ -4040,7 +4060,7 @@
               <a:rPr lang="en-GB" sz="2400" dirty="0">
                 <a:latin typeface="Avenir Next LT Pro" panose="020B0504020202020204" pitchFamily="34" charset="0"/>
               </a:rPr>
-              <a:t>Considering differences in pose, lighting, pump etc. I honestly don’t see much more than maintenance.</a:t>
+              <a:t>Considering differences in pose, lighting, pump etc. I honestly don’t see much more than maintenance… though maybe some of you see more/less?</a:t>
             </a:r>
           </a:p>
         </p:txBody>
@@ -4646,8 +4666,8 @@
         </p:nvSpPr>
         <p:spPr>
           <a:xfrm>
-            <a:off x="338400" y="700712"/>
-            <a:ext cx="7095600" cy="6740307"/>
+            <a:off x="338400" y="516046"/>
+            <a:ext cx="7095600" cy="7109639"/>
           </a:xfrm>
           <a:prstGeom prst="rect">
             <a:avLst/>
@@ -4677,7 +4697,7 @@
           <a:p>
             <a:pPr algn="ctr"/>
             <a:r>
-              <a:rPr lang="en-GB" sz="2400" dirty="0">
+              <a:rPr lang="en-GB" sz="2400" i="1" dirty="0">
                 <a:latin typeface="Avenir Next LT Pro" panose="020B0504020202020204" pitchFamily="34" charset="0"/>
               </a:rPr>
               <a:t>“Well, James, you typically train low volume, you haven’t really done a proper bulk, nor is your protein intake optimal”</a:t>
@@ -4695,7 +4715,7 @@
               <a:rPr lang="en-GB" sz="2400" dirty="0">
                 <a:latin typeface="Avenir Next LT Pro" panose="020B0504020202020204" pitchFamily="34" charset="0"/>
               </a:rPr>
-              <a:t>True… at least for the past 10-15 years I’ve trained with fairly low volume, haven’t deliberately bulked, though I have been through periods of much higher protein intake (~1.8-2.0 g/kg).</a:t>
+              <a:t>True… at least, for the past 10-15 years I’ve trained with fairly low volume and haven’t deliberately bulked, though I have been through periods of much higher protein intake (~1.8-2.0 g/kg).</a:t>
             </a:r>
           </a:p>
           <a:p>
@@ -4760,7 +4780,7 @@
         <p:spPr>
           <a:xfrm>
             <a:off x="338400" y="331380"/>
-            <a:ext cx="7095600" cy="7109639"/>
+            <a:ext cx="7095600" cy="7478970"/>
           </a:xfrm>
           <a:prstGeom prst="rect">
             <a:avLst/>
@@ -4808,7 +4828,19 @@
               <a:rPr lang="en-GB" sz="2400" i="1" dirty="0">
                 <a:latin typeface="Avenir Next LT Pro" panose="020B0504020202020204" pitchFamily="34" charset="0"/>
               </a:rPr>
-              <a:t>“Nihilists! Fuck me. I mean, say what you want about the tenets of Periodisation, Dude, at least it's an ethos”</a:t>
+              <a:t>“Nihilists! </a:t>
+            </a:r>
+            <a:r>
+              <a:rPr lang="en-GB" sz="2400" i="1" dirty="0" err="1">
+                <a:latin typeface="Avenir Next LT Pro" panose="020B0504020202020204" pitchFamily="34" charset="0"/>
+              </a:rPr>
+              <a:t>F#ck</a:t>
+            </a:r>
+            <a:r>
+              <a:rPr lang="en-GB" sz="2400" i="1" dirty="0">
+                <a:latin typeface="Avenir Next LT Pro" panose="020B0504020202020204" pitchFamily="34" charset="0"/>
+              </a:rPr>
+              <a:t> me. I mean, say what you want about the tenets of Periodisation, Dude, at least it's an ethos”</a:t>
             </a:r>
           </a:p>
           <a:p>
@@ -4823,7 +4855,7 @@
               <a:rPr lang="en-GB" sz="2400" dirty="0">
                 <a:latin typeface="Avenir Next LT Pro" panose="020B0504020202020204" pitchFamily="34" charset="0"/>
               </a:rPr>
-              <a:t>To be honest, I’ve enjoyed having a little goal to focus on during my cut… and so, just to keep that enjoyment, I’m setting another goal.</a:t>
+              <a:t>To be honest, despite never struggling with motivation for training, I’ve enjoyed having a little goal to focus on with this cut. So, just to keep that enjoyment a bit longer, I’m setting another goal.</a:t>
             </a:r>
           </a:p>
           <a:p>
@@ -4987,7 +5019,7 @@
               <a:rPr lang="en-GB" sz="2400" dirty="0">
                 <a:latin typeface="Avenir Next LT Pro" panose="020B0504020202020204" pitchFamily="34" charset="0"/>
               </a:rPr>
-              <a:t>I currently hit around ~5-6* fractional sets for biceps/triceps a week but will be increasing that to ~15* sets. I’ll track all my volume over that time using </a:t>
+              <a:t>I currently hit around ~6-7* fractional sets for biceps/triceps a week but will be increasing that to ~15* sets. I’ll track all my volume over that time using </a:t>
             </a:r>
             <a:r>
               <a:rPr lang="en-GB" sz="2400" dirty="0" err="1">
@@ -5014,7 +5046,7 @@
               <a:rPr lang="en-GB" sz="2400" dirty="0">
                 <a:latin typeface="Avenir Next LT Pro" panose="020B0504020202020204" pitchFamily="34" charset="0"/>
               </a:rPr>
-              <a:t>I’ll post the workouts in a later post sometime.</a:t>
+              <a:t>I’ll share the workouts in the next post.</a:t>
             </a:r>
             <a:endParaRPr lang="en-GB" sz="2400" i="1" dirty="0">
               <a:latin typeface="Avenir Next LT Pro" panose="020B0504020202020204" pitchFamily="34" charset="0"/>
@@ -5429,7 +5461,7 @@
               <a:rPr lang="en-GB" sz="3200" dirty="0">
                 <a:latin typeface="Avenir Next LT Pro" panose="020B0504020202020204" pitchFamily="34" charset="0"/>
               </a:rPr>
-              <a:t>Here’s my weight and calorie data over that period… (swipe </a:t>
+              <a:t>Here’s my weight and calorie data* over that period… (swipe </a:t>
             </a:r>
             <a:r>
               <a:rPr lang="en-GB" sz="3200" dirty="0">
@@ -5443,6 +5475,55 @@
                 <a:latin typeface="Avenir Next LT Pro" panose="020B0504020202020204" pitchFamily="34" charset="0"/>
               </a:rPr>
               <a:t>)</a:t>
+            </a:r>
+          </a:p>
+        </p:txBody>
+      </p:sp>
+      <p:sp>
+        <p:nvSpPr>
+          <p:cNvPr id="2" name="TextBox 1">
+            <a:extLst>
+              <a:ext uri="{FF2B5EF4-FFF2-40B4-BE49-F238E27FC236}">
+                <a16:creationId xmlns:a16="http://schemas.microsoft.com/office/drawing/2014/main" id="{28442B7D-6626-1A2F-4754-41355F26403B}"/>
+              </a:ext>
+            </a:extLst>
+          </p:cNvPr>
+          <p:cNvSpPr txBox="1"/>
+          <p:nvPr/>
+        </p:nvSpPr>
+        <p:spPr>
+          <a:xfrm>
+            <a:off x="3448972" y="7495401"/>
+            <a:ext cx="4323428" cy="276999"/>
+          </a:xfrm>
+          <a:prstGeom prst="rect">
+            <a:avLst/>
+          </a:prstGeom>
+          <a:noFill/>
+        </p:spPr>
+        <p:txBody>
+          <a:bodyPr wrap="none" rtlCol="0">
+            <a:spAutoFit/>
+          </a:bodyPr>
+          <a:lstStyle/>
+          <a:p>
+            <a:r>
+              <a:rPr lang="en-GB" sz="1200" dirty="0">
+                <a:latin typeface="Avenir Next LT Pro" panose="020B0504020202020204" pitchFamily="34" charset="0"/>
+              </a:rPr>
+              <a:t>*I downloaded data from MacroFactor, </a:t>
+            </a:r>
+            <a:r>
+              <a:rPr lang="en-GB" sz="1200" dirty="0" err="1">
+                <a:latin typeface="Avenir Next LT Pro" panose="020B0504020202020204" pitchFamily="34" charset="0"/>
+              </a:rPr>
+              <a:t>Withings</a:t>
+            </a:r>
+            <a:r>
+              <a:rPr lang="en-GB" sz="1200" dirty="0">
+                <a:latin typeface="Avenir Next LT Pro" panose="020B0504020202020204" pitchFamily="34" charset="0"/>
+              </a:rPr>
+              <a:t>, Google Fit</a:t>
             </a:r>
           </a:p>
         </p:txBody>
@@ -5582,7 +5663,7 @@
               <a:rPr lang="en-GB" sz="3200" dirty="0">
                 <a:latin typeface="Avenir Next LT Pro" panose="020B0504020202020204" pitchFamily="34" charset="0"/>
               </a:rPr>
-              <a:t>As you can see, there were some decent binges there.</a:t>
+              <a:t>As you can see, there were some decent binges in there.</a:t>
             </a:r>
           </a:p>
           <a:p>
@@ -5679,8 +5760,8 @@
         </p:nvSpPr>
         <p:spPr>
           <a:xfrm>
-            <a:off x="338400" y="660588"/>
-            <a:ext cx="7095600" cy="2677656"/>
+            <a:off x="338400" y="203388"/>
+            <a:ext cx="7095600" cy="3108543"/>
           </a:xfrm>
           <a:prstGeom prst="rect">
             <a:avLst/>
@@ -5698,7 +5779,7 @@
               <a:rPr lang="en-GB" sz="2800" dirty="0">
                 <a:latin typeface="Avenir Next LT Pro" panose="020B0504020202020204" pitchFamily="34" charset="0"/>
               </a:rPr>
-              <a:t>My maintenance calorie intake is pretty high due to a combo of daily steps, lifting 3x/week, running 3x/week, and during this period I did a lot of exercise “snacks” (random non-failure sets of pullups, dips, sissy squats throughout the day 2-3 times)</a:t>
+              <a:t>My maintenance calorie intake is pretty high due to a combo of daily steps, lifting 2-3x/week, running 2-3x/week*, and during this period I did a lot of exercise “snacks” (random non-failure sets of pullups, dips, sissy squats throughout the day 2-3 times)</a:t>
             </a:r>
           </a:p>
         </p:txBody>
@@ -5731,7 +5812,7 @@
         </p:blipFill>
         <p:spPr>
           <a:xfrm>
-            <a:off x="0" y="3886200"/>
+            <a:off x="0" y="3311931"/>
             <a:ext cx="7772400" cy="3886200"/>
           </a:xfrm>
           <a:prstGeom prst="rect">
@@ -5739,6 +5820,43 @@
           </a:prstGeom>
         </p:spPr>
       </p:pic>
+      <p:sp>
+        <p:nvSpPr>
+          <p:cNvPr id="2" name="TextBox 1">
+            <a:extLst>
+              <a:ext uri="{FF2B5EF4-FFF2-40B4-BE49-F238E27FC236}">
+                <a16:creationId xmlns:a16="http://schemas.microsoft.com/office/drawing/2014/main" id="{D0F8465F-068D-89CA-FD9B-AC7CBB9AC1A5}"/>
+              </a:ext>
+            </a:extLst>
+          </p:cNvPr>
+          <p:cNvSpPr txBox="1"/>
+          <p:nvPr/>
+        </p:nvSpPr>
+        <p:spPr>
+          <a:xfrm>
+            <a:off x="1907381" y="7495401"/>
+            <a:ext cx="5951566" cy="276999"/>
+          </a:xfrm>
+          <a:prstGeom prst="rect">
+            <a:avLst/>
+          </a:prstGeom>
+          <a:noFill/>
+        </p:spPr>
+        <p:txBody>
+          <a:bodyPr wrap="none" rtlCol="0">
+            <a:spAutoFit/>
+          </a:bodyPr>
+          <a:lstStyle/>
+          <a:p>
+            <a:r>
+              <a:rPr lang="en-GB" sz="1200" dirty="0">
+                <a:latin typeface="Avenir Next LT Pro" panose="020B0504020202020204" pitchFamily="34" charset="0"/>
+              </a:rPr>
+              <a:t>*Currently on a ~10-week incremental plan to try and get back to a 20-minute 5km</a:t>
+            </a:r>
+          </a:p>
+        </p:txBody>
+      </p:sp>
     </p:spTree>
     <p:extLst>
       <p:ext uri="{BB962C8B-B14F-4D97-AF65-F5344CB8AC3E}">
@@ -6014,7 +6132,7 @@
               <a:rPr lang="en-GB" sz="2800" dirty="0">
                 <a:latin typeface="Avenir Next LT Pro" panose="020B0504020202020204" pitchFamily="34" charset="0"/>
               </a:rPr>
-              <a:t>My weight been in a tight-ish range for years, but I have noticed changes in visible leanness over time.</a:t>
+              <a:t>My weight has been in a tight-ish range for years, but I have noticed changes in visible leanness over time.</a:t>
             </a:r>
           </a:p>
         </p:txBody>
@@ -6069,8 +6187,8 @@
         </p:nvSpPr>
         <p:spPr>
           <a:xfrm>
-            <a:off x="338400" y="885378"/>
-            <a:ext cx="7095600" cy="6740307"/>
+            <a:off x="338400" y="700712"/>
+            <a:ext cx="7095600" cy="6370975"/>
           </a:xfrm>
           <a:prstGeom prst="rect">
             <a:avLst/>
@@ -6088,7 +6206,7 @@
               <a:rPr lang="en-GB" sz="2400" dirty="0">
                 <a:latin typeface="Avenir Next LT Pro" panose="020B0504020202020204" pitchFamily="34" charset="0"/>
               </a:rPr>
-              <a:t>I actually had a DEXA scan specifically after finishing this cut to see how I had got on (you can see the report on the GitHub repo) which had me at 9% body fat.</a:t>
+              <a:t>I actually had a DEXA scan* specifically after finishing this cut to see how I had got on which had me at 9% body fat.</a:t>
             </a:r>
           </a:p>
           <a:p>
@@ -6103,7 +6221,19 @@
               <a:rPr lang="en-GB" sz="2400" dirty="0">
                 <a:latin typeface="Avenir Next LT Pro" panose="020B0504020202020204" pitchFamily="34" charset="0"/>
               </a:rPr>
-              <a:t>But I also had bodpod data as far back as 2010… so I figured why not take a look at the estimated fat free mass (FFM) over time and use that along with the past ~5 years of weight data (we’ve had the digital scales that long) to see whether I’ve gained any FFM.</a:t>
+              <a:t>But I also have had </a:t>
+            </a:r>
+            <a:r>
+              <a:rPr lang="en-GB" sz="2400" dirty="0" err="1">
+                <a:latin typeface="Avenir Next LT Pro" panose="020B0504020202020204" pitchFamily="34" charset="0"/>
+              </a:rPr>
+              <a:t>bodpods</a:t>
+            </a:r>
+            <a:r>
+              <a:rPr lang="en-GB" sz="2400" dirty="0">
+                <a:latin typeface="Avenir Next LT Pro" panose="020B0504020202020204" pitchFamily="34" charset="0"/>
+              </a:rPr>
+              <a:t> as far back as 2010… so I figured why not take a look at the estimated fat free mass (FFM) over time and use that along with the past ~5 years of weight data (we’ve had the digital scales that long) to see whether I’ve gained any FFM.</a:t>
             </a:r>
           </a:p>
           <a:p>
@@ -6166,6 +6296,43 @@
             <a:endParaRPr lang="en-GB" sz="2400" dirty="0">
               <a:latin typeface="Avenir Next LT Pro" panose="020B0504020202020204" pitchFamily="34" charset="0"/>
             </a:endParaRPr>
+          </a:p>
+        </p:txBody>
+      </p:sp>
+      <p:sp>
+        <p:nvSpPr>
+          <p:cNvPr id="2" name="TextBox 1">
+            <a:extLst>
+              <a:ext uri="{FF2B5EF4-FFF2-40B4-BE49-F238E27FC236}">
+                <a16:creationId xmlns:a16="http://schemas.microsoft.com/office/drawing/2014/main" id="{BCC90813-116D-EE2F-A48B-EBD71FFE1F9D}"/>
+              </a:ext>
+            </a:extLst>
+          </p:cNvPr>
+          <p:cNvSpPr txBox="1"/>
+          <p:nvPr/>
+        </p:nvSpPr>
+        <p:spPr>
+          <a:xfrm>
+            <a:off x="3343275" y="7495401"/>
+            <a:ext cx="4500719" cy="276999"/>
+          </a:xfrm>
+          <a:prstGeom prst="rect">
+            <a:avLst/>
+          </a:prstGeom>
+          <a:noFill/>
+        </p:spPr>
+        <p:txBody>
+          <a:bodyPr wrap="none" rtlCol="0">
+            <a:spAutoFit/>
+          </a:bodyPr>
+          <a:lstStyle/>
+          <a:p>
+            <a:r>
+              <a:rPr lang="en-GB" sz="1200" dirty="0">
+                <a:latin typeface="Avenir Next LT Pro" panose="020B0504020202020204" pitchFamily="34" charset="0"/>
+              </a:rPr>
+              <a:t>* You can see the report on the GitHub repo in the data folder</a:t>
+            </a:r>
           </a:p>
         </p:txBody>
       </p:sp>

</xml_diff>